<commit_message>
Sep 9, 2024, 12:07 PM
</commit_message>
<xml_diff>
--- a/Android App/Generate-Icons/AndroidBluetoothController.pptx
+++ b/Android App/Generate-Icons/AndroidBluetoothController.pptx
@@ -12,6 +12,7 @@
     <p:sldId id="262" r:id="rId6"/>
     <p:sldId id="257" r:id="rId7"/>
     <p:sldId id="256" r:id="rId8"/>
+    <p:sldId id="263" r:id="rId9"/>
   </p:sldIdLst>
   <p:sldSz cx="35999738" cy="35999738"/>
   <p:notesSz cx="6858000" cy="9144000"/>
@@ -249,7 +250,7 @@
           <a:p>
             <a:fld id="{AF924B78-A258-44E3-B447-BC8EA7269A39}" type="datetimeFigureOut">
               <a:rPr lang="en-PH" smtClean="0"/>
-              <a:t>08/09/2024</a:t>
+              <a:t>09/09/2024</a:t>
             </a:fld>
             <a:endParaRPr lang="en-PH"/>
           </a:p>
@@ -419,7 +420,7 @@
           <a:p>
             <a:fld id="{AF924B78-A258-44E3-B447-BC8EA7269A39}" type="datetimeFigureOut">
               <a:rPr lang="en-PH" smtClean="0"/>
-              <a:t>08/09/2024</a:t>
+              <a:t>09/09/2024</a:t>
             </a:fld>
             <a:endParaRPr lang="en-PH"/>
           </a:p>
@@ -599,7 +600,7 @@
           <a:p>
             <a:fld id="{AF924B78-A258-44E3-B447-BC8EA7269A39}" type="datetimeFigureOut">
               <a:rPr lang="en-PH" smtClean="0"/>
-              <a:t>08/09/2024</a:t>
+              <a:t>09/09/2024</a:t>
             </a:fld>
             <a:endParaRPr lang="en-PH"/>
           </a:p>
@@ -769,7 +770,7 @@
           <a:p>
             <a:fld id="{AF924B78-A258-44E3-B447-BC8EA7269A39}" type="datetimeFigureOut">
               <a:rPr lang="en-PH" smtClean="0"/>
-              <a:t>08/09/2024</a:t>
+              <a:t>09/09/2024</a:t>
             </a:fld>
             <a:endParaRPr lang="en-PH"/>
           </a:p>
@@ -1015,7 +1016,7 @@
           <a:p>
             <a:fld id="{AF924B78-A258-44E3-B447-BC8EA7269A39}" type="datetimeFigureOut">
               <a:rPr lang="en-PH" smtClean="0"/>
-              <a:t>08/09/2024</a:t>
+              <a:t>09/09/2024</a:t>
             </a:fld>
             <a:endParaRPr lang="en-PH"/>
           </a:p>
@@ -1247,7 +1248,7 @@
           <a:p>
             <a:fld id="{AF924B78-A258-44E3-B447-BC8EA7269A39}" type="datetimeFigureOut">
               <a:rPr lang="en-PH" smtClean="0"/>
-              <a:t>08/09/2024</a:t>
+              <a:t>09/09/2024</a:t>
             </a:fld>
             <a:endParaRPr lang="en-PH"/>
           </a:p>
@@ -1614,7 +1615,7 @@
           <a:p>
             <a:fld id="{AF924B78-A258-44E3-B447-BC8EA7269A39}" type="datetimeFigureOut">
               <a:rPr lang="en-PH" smtClean="0"/>
-              <a:t>08/09/2024</a:t>
+              <a:t>09/09/2024</a:t>
             </a:fld>
             <a:endParaRPr lang="en-PH"/>
           </a:p>
@@ -1732,7 +1733,7 @@
           <a:p>
             <a:fld id="{AF924B78-A258-44E3-B447-BC8EA7269A39}" type="datetimeFigureOut">
               <a:rPr lang="en-PH" smtClean="0"/>
-              <a:t>08/09/2024</a:t>
+              <a:t>09/09/2024</a:t>
             </a:fld>
             <a:endParaRPr lang="en-PH"/>
           </a:p>
@@ -1827,7 +1828,7 @@
           <a:p>
             <a:fld id="{AF924B78-A258-44E3-B447-BC8EA7269A39}" type="datetimeFigureOut">
               <a:rPr lang="en-PH" smtClean="0"/>
-              <a:t>08/09/2024</a:t>
+              <a:t>09/09/2024</a:t>
             </a:fld>
             <a:endParaRPr lang="en-PH"/>
           </a:p>
@@ -2104,7 +2105,7 @@
           <a:p>
             <a:fld id="{AF924B78-A258-44E3-B447-BC8EA7269A39}" type="datetimeFigureOut">
               <a:rPr lang="en-PH" smtClean="0"/>
-              <a:t>08/09/2024</a:t>
+              <a:t>09/09/2024</a:t>
             </a:fld>
             <a:endParaRPr lang="en-PH"/>
           </a:p>
@@ -2361,7 +2362,7 @@
           <a:p>
             <a:fld id="{AF924B78-A258-44E3-B447-BC8EA7269A39}" type="datetimeFigureOut">
               <a:rPr lang="en-PH" smtClean="0"/>
-              <a:t>08/09/2024</a:t>
+              <a:t>09/09/2024</a:t>
             </a:fld>
             <a:endParaRPr lang="en-PH"/>
           </a:p>
@@ -2579,7 +2580,7 @@
           <a:p>
             <a:fld id="{AF924B78-A258-44E3-B447-BC8EA7269A39}" type="datetimeFigureOut">
               <a:rPr lang="en-PH" smtClean="0"/>
-              <a:t>08/09/2024</a:t>
+              <a:t>09/09/2024</a:t>
             </a:fld>
             <a:endParaRPr lang="en-PH"/>
           </a:p>
@@ -3012,8 +3013,8 @@
         </p:blipFill>
         <p:spPr>
           <a:xfrm rot="16200000">
-            <a:off x="0" y="0"/>
-            <a:ext cx="35999738" cy="35999738"/>
+            <a:off x="3599869" y="3599869"/>
+            <a:ext cx="28800000" cy="28800000"/>
           </a:xfrm>
           <a:prstGeom prst="rect">
             <a:avLst/>
@@ -3078,8 +3079,8 @@
         </p:blipFill>
         <p:spPr>
           <a:xfrm rot="5400000">
-            <a:off x="0" y="0"/>
-            <a:ext cx="35999738" cy="35999738"/>
+            <a:off x="3599869" y="3599869"/>
+            <a:ext cx="28800000" cy="28800000"/>
           </a:xfrm>
           <a:prstGeom prst="rect">
             <a:avLst/>
@@ -3144,8 +3145,8 @@
         </p:blipFill>
         <p:spPr>
           <a:xfrm rot="10800000">
-            <a:off x="0" y="0"/>
-            <a:ext cx="35999738" cy="35999738"/>
+            <a:off x="3599870" y="3599869"/>
+            <a:ext cx="28800000" cy="28800000"/>
           </a:xfrm>
           <a:prstGeom prst="rect">
             <a:avLst/>
@@ -3210,8 +3211,8 @@
         </p:blipFill>
         <p:spPr>
           <a:xfrm>
-            <a:off x="0" y="0"/>
-            <a:ext cx="35999738" cy="35999738"/>
+            <a:off x="3599869" y="3599869"/>
+            <a:ext cx="28800000" cy="28800000"/>
           </a:xfrm>
           <a:prstGeom prst="rect">
             <a:avLst/>
@@ -3250,10 +3251,10 @@
       </p:grpSpPr>
       <p:pic>
         <p:nvPicPr>
-          <p:cNvPr id="8" name="Picture 7">
+          <p:cNvPr id="3" name="Picture 2">
             <a:extLst>
               <a:ext uri="{FF2B5EF4-FFF2-40B4-BE49-F238E27FC236}">
-                <a16:creationId xmlns:a16="http://schemas.microsoft.com/office/drawing/2014/main" id="{169818BC-6BDD-2E18-A45B-940220E039FC}"/>
+                <a16:creationId xmlns:a16="http://schemas.microsoft.com/office/drawing/2014/main" id="{5F9FBA4D-7BB7-761A-782B-0205D8F11046}"/>
               </a:ext>
             </a:extLst>
           </p:cNvPr>
@@ -3332,8 +3333,8 @@
         </p:blipFill>
         <p:spPr>
           <a:xfrm>
-            <a:off x="0" y="0"/>
-            <a:ext cx="35999738" cy="35999738"/>
+            <a:off x="3599869" y="3599869"/>
+            <a:ext cx="28800000" cy="28800000"/>
           </a:xfrm>
           <a:prstGeom prst="rect">
             <a:avLst/>
@@ -3424,10 +3425,10 @@
       </p:sp>
       <p:pic>
         <p:nvPicPr>
-          <p:cNvPr id="20" name="Picture 19" descr="A black background with a black square&#10;&#10;Description automatically generated with medium confidence">
+          <p:cNvPr id="5" name="Picture 4">
             <a:extLst>
               <a:ext uri="{FF2B5EF4-FFF2-40B4-BE49-F238E27FC236}">
-                <a16:creationId xmlns:a16="http://schemas.microsoft.com/office/drawing/2014/main" id="{D4186098-E1C2-5E41-06E0-E853D0233DA3}"/>
+                <a16:creationId xmlns:a16="http://schemas.microsoft.com/office/drawing/2014/main" id="{8E5E01D1-490D-EDDF-7E51-25DBCB4D31CB}"/>
               </a:ext>
             </a:extLst>
           </p:cNvPr>
@@ -3437,21 +3438,15 @@
           <p:nvPr/>
         </p:nvPicPr>
         <p:blipFill>
-          <a:blip r:embed="rId2">
-            <a:extLst>
-              <a:ext uri="{28A0092B-C50C-407E-A947-70E740481C1C}">
-                <a14:useLocalDpi xmlns:a14="http://schemas.microsoft.com/office/drawing/2010/main" val="0"/>
-              </a:ext>
-            </a:extLst>
-          </a:blip>
+          <a:blip r:embed="rId2"/>
           <a:stretch>
             <a:fillRect/>
           </a:stretch>
         </p:blipFill>
         <p:spPr>
           <a:xfrm>
-            <a:off x="0" y="0"/>
-            <a:ext cx="35999738" cy="35999738"/>
+            <a:off x="3599869" y="3599869"/>
+            <a:ext cx="28800000" cy="28800000"/>
           </a:xfrm>
           <a:prstGeom prst="rect">
             <a:avLst/>
@@ -3462,6 +3457,126 @@
     <p:extLst>
       <p:ext uri="{BB962C8B-B14F-4D97-AF65-F5344CB8AC3E}">
         <p14:creationId xmlns:p14="http://schemas.microsoft.com/office/powerpoint/2010/main" val="4103512900"/>
+      </p:ext>
+    </p:extLst>
+  </p:cSld>
+  <p:clrMapOvr>
+    <a:masterClrMapping/>
+  </p:clrMapOvr>
+</p:sld>
+</file>
+
+<file path=ppt/slides/slide8.xml><?xml version="1.0" encoding="utf-8"?>
+<p:sld xmlns:a="http://schemas.openxmlformats.org/drawingml/2006/main" xmlns:r="http://schemas.openxmlformats.org/officeDocument/2006/relationships" xmlns:p="http://schemas.openxmlformats.org/presentationml/2006/main">
+  <p:cSld>
+    <p:spTree>
+      <p:nvGrpSpPr>
+        <p:cNvPr id="1" name=""/>
+        <p:cNvGrpSpPr/>
+        <p:nvPr/>
+      </p:nvGrpSpPr>
+      <p:grpSpPr>
+        <a:xfrm>
+          <a:off x="0" y="0"/>
+          <a:ext cx="0" cy="0"/>
+          <a:chOff x="0" y="0"/>
+          <a:chExt cx="0" cy="0"/>
+        </a:xfrm>
+      </p:grpSpPr>
+      <p:pic>
+        <p:nvPicPr>
+          <p:cNvPr id="7" name="Picture 6">
+            <a:extLst>
+              <a:ext uri="{FF2B5EF4-FFF2-40B4-BE49-F238E27FC236}">
+                <a16:creationId xmlns:a16="http://schemas.microsoft.com/office/drawing/2014/main" id="{6312CA21-7B2E-12CB-4FF2-C04B8EB835DB}"/>
+              </a:ext>
+            </a:extLst>
+          </p:cNvPr>
+          <p:cNvPicPr>
+            <a:picLocks noChangeAspect="1"/>
+          </p:cNvPicPr>
+          <p:nvPr/>
+        </p:nvPicPr>
+        <p:blipFill>
+          <a:blip r:embed="rId2"/>
+          <a:stretch>
+            <a:fillRect/>
+          </a:stretch>
+        </p:blipFill>
+        <p:spPr>
+          <a:xfrm>
+            <a:off x="1799869" y="3599738"/>
+            <a:ext cx="32400000" cy="32400000"/>
+          </a:xfrm>
+          <a:prstGeom prst="rect">
+            <a:avLst/>
+          </a:prstGeom>
+        </p:spPr>
+      </p:pic>
+      <p:pic>
+        <p:nvPicPr>
+          <p:cNvPr id="9" name="Picture 8">
+            <a:extLst>
+              <a:ext uri="{FF2B5EF4-FFF2-40B4-BE49-F238E27FC236}">
+                <a16:creationId xmlns:a16="http://schemas.microsoft.com/office/drawing/2014/main" id="{8A9C1F8B-0178-B83F-8FD7-887914E3265C}"/>
+              </a:ext>
+            </a:extLst>
+          </p:cNvPr>
+          <p:cNvPicPr>
+            <a:picLocks noChangeAspect="1"/>
+          </p:cNvPicPr>
+          <p:nvPr/>
+        </p:nvPicPr>
+        <p:blipFill>
+          <a:blip r:embed="rId3"/>
+          <a:stretch>
+            <a:fillRect/>
+          </a:stretch>
+        </p:blipFill>
+        <p:spPr>
+          <a:xfrm>
+            <a:off x="25199869" y="1889760"/>
+            <a:ext cx="9000000" cy="9000000"/>
+          </a:xfrm>
+          <a:prstGeom prst="rect">
+            <a:avLst/>
+          </a:prstGeom>
+        </p:spPr>
+      </p:pic>
+      <p:pic>
+        <p:nvPicPr>
+          <p:cNvPr id="15" name="Picture 14">
+            <a:extLst>
+              <a:ext uri="{FF2B5EF4-FFF2-40B4-BE49-F238E27FC236}">
+                <a16:creationId xmlns:a16="http://schemas.microsoft.com/office/drawing/2014/main" id="{EE078250-1170-DB8B-4619-202979D52BCE}"/>
+              </a:ext>
+            </a:extLst>
+          </p:cNvPr>
+          <p:cNvPicPr>
+            <a:picLocks noChangeAspect="1"/>
+          </p:cNvPicPr>
+          <p:nvPr/>
+        </p:nvPicPr>
+        <p:blipFill>
+          <a:blip r:embed="rId4"/>
+          <a:stretch>
+            <a:fillRect/>
+          </a:stretch>
+        </p:blipFill>
+        <p:spPr>
+          <a:xfrm>
+            <a:off x="1799869" y="1889760"/>
+            <a:ext cx="9000000" cy="9000000"/>
+          </a:xfrm>
+          <a:prstGeom prst="rect">
+            <a:avLst/>
+          </a:prstGeom>
+        </p:spPr>
+      </p:pic>
+    </p:spTree>
+    <p:extLst>
+      <p:ext uri="{BB962C8B-B14F-4D97-AF65-F5344CB8AC3E}">
+        <p14:creationId xmlns:p14="http://schemas.microsoft.com/office/powerpoint/2010/main" val="3204299536"/>
       </p:ext>
     </p:extLst>
   </p:cSld>

</xml_diff>